<commit_message>
Adiciona informações sobre pasta do projeto JaCoCo
Um dos motivos do erro
"Skipping JaCoCo execution due to missing execution data file"
é a existência de espaços no caminho do projeto.

Adiciona notas no README e no arquivo de slides.
</commit_message>
<xml_diff>
--- a/code-coverage.pptx
+++ b/code-coverage.pptx
@@ -5,7 +5,7 @@
     <p:sldMasterId id="2147483648" r:id="rId1"/>
   </p:sldMasterIdLst>
   <p:notesMasterIdLst>
-    <p:notesMasterId r:id="rId13"/>
+    <p:notesMasterId r:id="rId14"/>
   </p:notesMasterIdLst>
   <p:sldIdLst>
     <p:sldId id="258" r:id="rId2"/>
@@ -18,7 +18,8 @@
     <p:sldId id="361" r:id="rId9"/>
     <p:sldId id="362" r:id="rId10"/>
     <p:sldId id="363" r:id="rId11"/>
-    <p:sldId id="364" r:id="rId12"/>
+    <p:sldId id="365" r:id="rId12"/>
+    <p:sldId id="364" r:id="rId13"/>
   </p:sldIdLst>
   <p:sldSz cx="12192000" cy="6858000"/>
   <p:notesSz cx="6858000" cy="9144000"/>
@@ -207,7 +208,7 @@
           <a:p>
             <a:fld id="{A5C20BB3-3CCB-4FE5-991B-82F6BCB48AF3}" type="datetimeFigureOut">
               <a:rPr lang="en-US" smtClean="0"/>
-              <a:t>8/11/20</a:t>
+              <a:t>8/18/20</a:t>
             </a:fld>
             <a:endParaRPr lang="en-US" dirty="0"/>
           </a:p>
@@ -804,7 +805,7 @@
             <a:fld id="{B61BEF0D-F0BB-DE4B-95CE-6DB70DBA9567}" type="datetimeFigureOut">
               <a:rPr lang="en-US"/>
               <a:pPr/>
-              <a:t>8/11/20</a:t>
+              <a:t>8/18/20</a:t>
             </a:fld>
             <a:endParaRPr lang="en-US" dirty="0"/>
           </a:p>
@@ -1068,7 +1069,7 @@
             <a:fld id="{B61BEF0D-F0BB-DE4B-95CE-6DB70DBA9567}" type="datetimeFigureOut">
               <a:rPr lang="en-US"/>
               <a:pPr/>
-              <a:t>8/11/20</a:t>
+              <a:t>8/18/20</a:t>
             </a:fld>
             <a:endParaRPr lang="en-US" dirty="0"/>
           </a:p>
@@ -1305,7 +1306,7 @@
             <a:fld id="{B61BEF0D-F0BB-DE4B-95CE-6DB70DBA9567}" type="datetimeFigureOut">
               <a:rPr lang="en-US"/>
               <a:pPr/>
-              <a:t>8/11/20</a:t>
+              <a:t>8/18/20</a:t>
             </a:fld>
             <a:endParaRPr lang="en-US" dirty="0"/>
           </a:p>
@@ -1547,7 +1548,7 @@
             <a:fld id="{B61BEF0D-F0BB-DE4B-95CE-6DB70DBA9567}" type="datetimeFigureOut">
               <a:rPr lang="en-US"/>
               <a:pPr/>
-              <a:t>8/11/20</a:t>
+              <a:t>8/18/20</a:t>
             </a:fld>
             <a:endParaRPr lang="en-US" dirty="0"/>
           </a:p>
@@ -1856,7 +1857,7 @@
             <a:fld id="{B61BEF0D-F0BB-DE4B-95CE-6DB70DBA9567}" type="datetimeFigureOut">
               <a:rPr lang="en-US"/>
               <a:pPr/>
-              <a:t>8/11/20</a:t>
+              <a:t>8/18/20</a:t>
             </a:fld>
             <a:endParaRPr lang="en-US" dirty="0"/>
           </a:p>
@@ -2160,7 +2161,7 @@
             <a:fld id="{B61BEF0D-F0BB-DE4B-95CE-6DB70DBA9567}" type="datetimeFigureOut">
               <a:rPr lang="en-US"/>
               <a:pPr/>
-              <a:t>8/11/20</a:t>
+              <a:t>8/18/20</a:t>
             </a:fld>
             <a:endParaRPr lang="en-US" dirty="0"/>
           </a:p>
@@ -2584,7 +2585,7 @@
             <a:fld id="{B61BEF0D-F0BB-DE4B-95CE-6DB70DBA9567}" type="datetimeFigureOut">
               <a:rPr lang="en-US"/>
               <a:pPr/>
-              <a:t>8/11/20</a:t>
+              <a:t>8/18/20</a:t>
             </a:fld>
             <a:endParaRPr lang="en-US" dirty="0"/>
           </a:p>
@@ -2748,7 +2749,7 @@
             <a:fld id="{B61BEF0D-F0BB-DE4B-95CE-6DB70DBA9567}" type="datetimeFigureOut">
               <a:rPr lang="en-US"/>
               <a:pPr/>
-              <a:t>8/11/20</a:t>
+              <a:t>8/18/20</a:t>
             </a:fld>
             <a:endParaRPr lang="en-US" dirty="0"/>
           </a:p>
@@ -2845,7 +2846,7 @@
             <a:fld id="{B61BEF0D-F0BB-DE4B-95CE-6DB70DBA9567}" type="datetimeFigureOut">
               <a:rPr lang="en-US"/>
               <a:pPr/>
-              <a:t>8/11/20</a:t>
+              <a:t>8/18/20</a:t>
             </a:fld>
             <a:endParaRPr lang="en-US" dirty="0"/>
           </a:p>
@@ -3225,7 +3226,7 @@
             <a:fld id="{B61BEF0D-F0BB-DE4B-95CE-6DB70DBA9567}" type="datetimeFigureOut">
               <a:rPr lang="en-US"/>
               <a:pPr/>
-              <a:t>8/11/20</a:t>
+              <a:t>8/18/20</a:t>
             </a:fld>
             <a:endParaRPr lang="en-US" dirty="0"/>
           </a:p>
@@ -3515,7 +3516,7 @@
             <a:fld id="{B61BEF0D-F0BB-DE4B-95CE-6DB70DBA9567}" type="datetimeFigureOut">
               <a:rPr lang="en-US"/>
               <a:pPr/>
-              <a:t>8/11/20</a:t>
+              <a:t>8/18/20</a:t>
             </a:fld>
             <a:endParaRPr lang="en-US" dirty="0"/>
           </a:p>
@@ -3728,7 +3729,7 @@
             <a:fld id="{B61BEF0D-F0BB-DE4B-95CE-6DB70DBA9567}" type="datetimeFigureOut">
               <a:rPr lang="en-US"/>
               <a:pPr/>
-              <a:t>8/11/20</a:t>
+              <a:t>8/18/20</a:t>
             </a:fld>
             <a:endParaRPr lang="en-US" dirty="0"/>
           </a:p>
@@ -5071,6 +5072,758 @@
 </file>
 
 <file path=ppt/slides/slide11.xml><?xml version="1.0" encoding="utf-8"?>
+<p:sld xmlns:a="http://schemas.openxmlformats.org/drawingml/2006/main" xmlns:r="http://schemas.openxmlformats.org/officeDocument/2006/relationships" xmlns:p="http://schemas.openxmlformats.org/presentationml/2006/main">
+  <p:cSld>
+    <p:bg>
+      <p:bgPr>
+        <a:solidFill>
+          <a:schemeClr val="bg1"/>
+        </a:solidFill>
+        <a:effectLst/>
+      </p:bgPr>
+    </p:bg>
+    <p:spTree>
+      <p:nvGrpSpPr>
+        <p:cNvPr id="1" name=""/>
+        <p:cNvGrpSpPr/>
+        <p:nvPr/>
+      </p:nvGrpSpPr>
+      <p:grpSpPr>
+        <a:xfrm>
+          <a:off x="0" y="0"/>
+          <a:ext cx="0" cy="0"/>
+          <a:chOff x="0" y="0"/>
+          <a:chExt cx="0" cy="0"/>
+        </a:xfrm>
+      </p:grpSpPr>
+      <p:sp>
+        <p:nvSpPr>
+          <p:cNvPr id="34" name="Rectangle 33">
+            <a:extLst>
+              <a:ext uri="{FF2B5EF4-FFF2-40B4-BE49-F238E27FC236}">
+                <a16:creationId xmlns:a16="http://schemas.microsoft.com/office/drawing/2014/main" id="{0E830057-F4EE-412A-8526-36BE1CE18C85}"/>
+              </a:ext>
+              <a:ext uri="{C183D7F6-B498-43B3-948B-1728B52AA6E4}">
+                <adec:decorative xmlns:adec="http://schemas.microsoft.com/office/drawing/2017/decorative" val="1"/>
+              </a:ext>
+            </a:extLst>
+          </p:cNvPr>
+          <p:cNvSpPr>
+            <a:spLocks noGrp="1" noRot="1" noChangeAspect="1" noMove="1" noResize="1" noEditPoints="1" noAdjustHandles="1" noChangeArrowheads="1" noChangeShapeType="1" noTextEdit="1"/>
+          </p:cNvSpPr>
+          <p:nvPr>
+            <p:extLst>
+              <p:ext uri="{386F3935-93C4-4BCD-93E2-E3B085C9AB24}">
+                <p16:designElem xmlns:p16="http://schemas.microsoft.com/office/powerpoint/2015/main" val="1"/>
+              </p:ext>
+            </p:extLst>
+          </p:nvPr>
+        </p:nvSpPr>
+        <p:spPr>
+          <a:xfrm>
+            <a:off x="446534" y="457200"/>
+            <a:ext cx="3703320" cy="94997"/>
+          </a:xfrm>
+          <a:prstGeom prst="rect">
+            <a:avLst/>
+          </a:prstGeom>
+          <a:solidFill>
+            <a:schemeClr val="accent1"/>
+          </a:solidFill>
+          <a:ln>
+            <a:noFill/>
+          </a:ln>
+          <a:effectLst/>
+        </p:spPr>
+        <p:style>
+          <a:lnRef idx="1">
+            <a:schemeClr val="accent1"/>
+          </a:lnRef>
+          <a:fillRef idx="3">
+            <a:schemeClr val="accent1"/>
+          </a:fillRef>
+          <a:effectRef idx="2">
+            <a:schemeClr val="accent1"/>
+          </a:effectRef>
+          <a:fontRef idx="minor">
+            <a:schemeClr val="lt1"/>
+          </a:fontRef>
+        </p:style>
+      </p:sp>
+      <p:sp>
+        <p:nvSpPr>
+          <p:cNvPr id="36" name="Rectangle 35">
+            <a:extLst>
+              <a:ext uri="{FF2B5EF4-FFF2-40B4-BE49-F238E27FC236}">
+                <a16:creationId xmlns:a16="http://schemas.microsoft.com/office/drawing/2014/main" id="{BAAEBA82-E2D4-4653-AEE3-E95B330DDA21}"/>
+              </a:ext>
+              <a:ext uri="{C183D7F6-B498-43B3-948B-1728B52AA6E4}">
+                <adec:decorative xmlns:adec="http://schemas.microsoft.com/office/drawing/2017/decorative" val="1"/>
+              </a:ext>
+            </a:extLst>
+          </p:cNvPr>
+          <p:cNvSpPr>
+            <a:spLocks noGrp="1" noRot="1" noChangeAspect="1" noMove="1" noResize="1" noEditPoints="1" noAdjustHandles="1" noChangeArrowheads="1" noChangeShapeType="1" noTextEdit="1"/>
+          </p:cNvSpPr>
+          <p:nvPr>
+            <p:extLst>
+              <p:ext uri="{386F3935-93C4-4BCD-93E2-E3B085C9AB24}">
+                <p16:designElem xmlns:p16="http://schemas.microsoft.com/office/powerpoint/2015/main" val="1"/>
+              </p:ext>
+            </p:extLst>
+          </p:nvPr>
+        </p:nvSpPr>
+        <p:spPr>
+          <a:xfrm>
+            <a:off x="8042147" y="453643"/>
+            <a:ext cx="3703320" cy="98554"/>
+          </a:xfrm>
+          <a:prstGeom prst="rect">
+            <a:avLst/>
+          </a:prstGeom>
+          <a:solidFill>
+            <a:schemeClr val="accent4"/>
+          </a:solidFill>
+          <a:ln>
+            <a:noFill/>
+          </a:ln>
+          <a:effectLst/>
+        </p:spPr>
+        <p:style>
+          <a:lnRef idx="1">
+            <a:schemeClr val="accent1"/>
+          </a:lnRef>
+          <a:fillRef idx="3">
+            <a:schemeClr val="accent1"/>
+          </a:fillRef>
+          <a:effectRef idx="2">
+            <a:schemeClr val="accent1"/>
+          </a:effectRef>
+          <a:fontRef idx="minor">
+            <a:schemeClr val="lt1"/>
+          </a:fontRef>
+        </p:style>
+      </p:sp>
+      <p:sp>
+        <p:nvSpPr>
+          <p:cNvPr id="38" name="Rectangle 37">
+            <a:extLst>
+              <a:ext uri="{FF2B5EF4-FFF2-40B4-BE49-F238E27FC236}">
+                <a16:creationId xmlns:a16="http://schemas.microsoft.com/office/drawing/2014/main" id="{2386509E-DAF8-4DA0-B09B-FA3FB341C2BC}"/>
+              </a:ext>
+              <a:ext uri="{C183D7F6-B498-43B3-948B-1728B52AA6E4}">
+                <adec:decorative xmlns:adec="http://schemas.microsoft.com/office/drawing/2017/decorative" val="1"/>
+              </a:ext>
+            </a:extLst>
+          </p:cNvPr>
+          <p:cNvSpPr>
+            <a:spLocks noGrp="1" noRot="1" noChangeAspect="1" noMove="1" noResize="1" noEditPoints="1" noAdjustHandles="1" noChangeArrowheads="1" noChangeShapeType="1" noTextEdit="1"/>
+          </p:cNvSpPr>
+          <p:nvPr>
+            <p:extLst>
+              <p:ext uri="{386F3935-93C4-4BCD-93E2-E3B085C9AB24}">
+                <p16:designElem xmlns:p16="http://schemas.microsoft.com/office/powerpoint/2015/main" val="1"/>
+              </p:ext>
+            </p:extLst>
+          </p:nvPr>
+        </p:nvSpPr>
+        <p:spPr>
+          <a:xfrm>
+            <a:off x="4241830" y="457200"/>
+            <a:ext cx="3703320" cy="91440"/>
+          </a:xfrm>
+          <a:prstGeom prst="rect">
+            <a:avLst/>
+          </a:prstGeom>
+          <a:solidFill>
+            <a:schemeClr val="accent2"/>
+          </a:solidFill>
+          <a:ln>
+            <a:noFill/>
+          </a:ln>
+          <a:effectLst/>
+        </p:spPr>
+        <p:style>
+          <a:lnRef idx="1">
+            <a:schemeClr val="accent1"/>
+          </a:lnRef>
+          <a:fillRef idx="3">
+            <a:schemeClr val="accent1"/>
+          </a:fillRef>
+          <a:effectRef idx="2">
+            <a:schemeClr val="accent1"/>
+          </a:effectRef>
+          <a:fontRef idx="minor">
+            <a:schemeClr val="lt1"/>
+          </a:fontRef>
+        </p:style>
+      </p:sp>
+      <p:sp>
+        <p:nvSpPr>
+          <p:cNvPr id="40" name="Rectangle 39">
+            <a:extLst>
+              <a:ext uri="{FF2B5EF4-FFF2-40B4-BE49-F238E27FC236}">
+                <a16:creationId xmlns:a16="http://schemas.microsoft.com/office/drawing/2014/main" id="{44E11946-6976-4B44-971A-07BFBE9544A6}"/>
+              </a:ext>
+              <a:ext uri="{C183D7F6-B498-43B3-948B-1728B52AA6E4}">
+                <adec:decorative xmlns:adec="http://schemas.microsoft.com/office/drawing/2017/decorative" val="1"/>
+              </a:ext>
+            </a:extLst>
+          </p:cNvPr>
+          <p:cNvSpPr>
+            <a:spLocks noGrp="1" noRot="1" noChangeAspect="1" noMove="1" noResize="1" noEditPoints="1" noAdjustHandles="1" noChangeArrowheads="1" noChangeShapeType="1" noTextEdit="1"/>
+          </p:cNvSpPr>
+          <p:nvPr>
+            <p:extLst>
+              <p:ext uri="{386F3935-93C4-4BCD-93E2-E3B085C9AB24}">
+                <p16:designElem xmlns:p16="http://schemas.microsoft.com/office/powerpoint/2015/main" val="1"/>
+              </p:ext>
+            </p:extLst>
+          </p:nvPr>
+        </p:nvSpPr>
+        <p:spPr>
+          <a:xfrm>
+            <a:off x="446534" y="3085765"/>
+            <a:ext cx="11262866" cy="3304800"/>
+          </a:xfrm>
+          <a:prstGeom prst="rect">
+            <a:avLst/>
+          </a:prstGeom>
+          <a:solidFill>
+            <a:schemeClr val="accent1"/>
+          </a:solidFill>
+          <a:ln>
+            <a:noFill/>
+          </a:ln>
+          <a:effectLst/>
+        </p:spPr>
+        <p:style>
+          <a:lnRef idx="1">
+            <a:schemeClr val="accent1"/>
+          </a:lnRef>
+          <a:fillRef idx="3">
+            <a:schemeClr val="accent1"/>
+          </a:fillRef>
+          <a:effectRef idx="2">
+            <a:schemeClr val="accent1"/>
+          </a:effectRef>
+          <a:fontRef idx="minor">
+            <a:schemeClr val="lt1"/>
+          </a:fontRef>
+        </p:style>
+      </p:sp>
+      <p:sp useBgFill="1">
+        <p:nvSpPr>
+          <p:cNvPr id="42" name="Rectangle 41">
+            <a:extLst>
+              <a:ext uri="{FF2B5EF4-FFF2-40B4-BE49-F238E27FC236}">
+                <a16:creationId xmlns:a16="http://schemas.microsoft.com/office/drawing/2014/main" id="{B000835B-EF30-458A-BD64-36EDE5F91BF6}"/>
+              </a:ext>
+              <a:ext uri="{C183D7F6-B498-43B3-948B-1728B52AA6E4}">
+                <adec:decorative xmlns:adec="http://schemas.microsoft.com/office/drawing/2017/decorative" val="1"/>
+              </a:ext>
+            </a:extLst>
+          </p:cNvPr>
+          <p:cNvSpPr>
+            <a:spLocks noGrp="1" noRot="1" noChangeAspect="1" noMove="1" noResize="1" noEditPoints="1" noAdjustHandles="1" noChangeArrowheads="1" noChangeShapeType="1" noTextEdit="1"/>
+          </p:cNvSpPr>
+          <p:nvPr>
+            <p:extLst>
+              <p:ext uri="{386F3935-93C4-4BCD-93E2-E3B085C9AB24}">
+                <p16:designElem xmlns:p16="http://schemas.microsoft.com/office/powerpoint/2015/main" val="1"/>
+              </p:ext>
+            </p:extLst>
+          </p:nvPr>
+        </p:nvSpPr>
+        <p:spPr>
+          <a:xfrm>
+            <a:off x="0" y="723900"/>
+            <a:ext cx="12192000" cy="6134100"/>
+          </a:xfrm>
+          <a:prstGeom prst="rect">
+            <a:avLst/>
+          </a:prstGeom>
+          <a:ln>
+            <a:noFill/>
+          </a:ln>
+        </p:spPr>
+        <p:style>
+          <a:lnRef idx="2">
+            <a:schemeClr val="accent1">
+              <a:shade val="50000"/>
+            </a:schemeClr>
+          </a:lnRef>
+          <a:fillRef idx="1">
+            <a:schemeClr val="accent1"/>
+          </a:fillRef>
+          <a:effectRef idx="0">
+            <a:schemeClr val="accent1"/>
+          </a:effectRef>
+          <a:fontRef idx="minor">
+            <a:schemeClr val="lt1"/>
+          </a:fontRef>
+        </p:style>
+        <p:txBody>
+          <a:bodyPr rtlCol="0" anchor="ctr"/>
+          <a:lstStyle/>
+          <a:p>
+            <a:pPr algn="ctr"/>
+            <a:endParaRPr lang="en-US"/>
+          </a:p>
+        </p:txBody>
+      </p:sp>
+      <p:sp>
+        <p:nvSpPr>
+          <p:cNvPr id="44" name="Rectangle 43">
+            <a:extLst>
+              <a:ext uri="{FF2B5EF4-FFF2-40B4-BE49-F238E27FC236}">
+                <a16:creationId xmlns:a16="http://schemas.microsoft.com/office/drawing/2014/main" id="{4DDC1FE7-FCC2-4DF5-90E9-CCE370FBE516}"/>
+              </a:ext>
+              <a:ext uri="{C183D7F6-B498-43B3-948B-1728B52AA6E4}">
+                <adec:decorative xmlns:adec="http://schemas.microsoft.com/office/drawing/2017/decorative" val="1"/>
+              </a:ext>
+            </a:extLst>
+          </p:cNvPr>
+          <p:cNvSpPr>
+            <a:spLocks noGrp="1" noRot="1" noChangeAspect="1" noMove="1" noResize="1" noEditPoints="1" noAdjustHandles="1" noChangeArrowheads="1" noChangeShapeType="1" noTextEdit="1"/>
+          </p:cNvSpPr>
+          <p:nvPr>
+            <p:extLst>
+              <p:ext uri="{386F3935-93C4-4BCD-93E2-E3B085C9AB24}">
+                <p16:designElem xmlns:p16="http://schemas.microsoft.com/office/powerpoint/2015/main" val="1"/>
+              </p:ext>
+            </p:extLst>
+          </p:nvPr>
+        </p:nvSpPr>
+        <p:spPr>
+          <a:xfrm>
+            <a:off x="4241830" y="457200"/>
+            <a:ext cx="3703320" cy="91440"/>
+          </a:xfrm>
+          <a:prstGeom prst="rect">
+            <a:avLst/>
+          </a:prstGeom>
+          <a:solidFill>
+            <a:srgbClr val="061EFF"/>
+          </a:solidFill>
+          <a:ln>
+            <a:noFill/>
+          </a:ln>
+          <a:effectLst/>
+        </p:spPr>
+        <p:style>
+          <a:lnRef idx="1">
+            <a:schemeClr val="accent1"/>
+          </a:lnRef>
+          <a:fillRef idx="3">
+            <a:schemeClr val="accent1"/>
+          </a:fillRef>
+          <a:effectRef idx="2">
+            <a:schemeClr val="accent1"/>
+          </a:effectRef>
+          <a:fontRef idx="minor">
+            <a:schemeClr val="lt1"/>
+          </a:fontRef>
+        </p:style>
+      </p:sp>
+      <p:sp>
+        <p:nvSpPr>
+          <p:cNvPr id="33" name="Rectangle 32">
+            <a:extLst>
+              <a:ext uri="{FF2B5EF4-FFF2-40B4-BE49-F238E27FC236}">
+                <a16:creationId xmlns:a16="http://schemas.microsoft.com/office/drawing/2014/main" id="{15DDFFD4-DD9D-7843-A9D0-24AFD914E267}"/>
+              </a:ext>
+            </a:extLst>
+          </p:cNvPr>
+          <p:cNvSpPr/>
+          <p:nvPr/>
+        </p:nvSpPr>
+        <p:spPr>
+          <a:xfrm>
+            <a:off x="3551114" y="667532"/>
+            <a:ext cx="5692584" cy="923330"/>
+          </a:xfrm>
+          <a:prstGeom prst="rect">
+            <a:avLst/>
+          </a:prstGeom>
+        </p:spPr>
+        <p:txBody>
+          <a:bodyPr wrap="none">
+            <a:spAutoFit/>
+          </a:bodyPr>
+          <a:lstStyle/>
+          <a:p>
+            <a:pPr algn="just"/>
+            <a:r>
+              <a:rPr lang="pt-PT" sz="5400" dirty="0"/>
+              <a:t>Mas antes de iniciar</a:t>
+            </a:r>
+          </a:p>
+        </p:txBody>
+      </p:sp>
+      <p:sp>
+        <p:nvSpPr>
+          <p:cNvPr id="2" name="TextBox 1">
+            <a:extLst>
+              <a:ext uri="{FF2B5EF4-FFF2-40B4-BE49-F238E27FC236}">
+                <a16:creationId xmlns:a16="http://schemas.microsoft.com/office/drawing/2014/main" id="{E8A641CC-52D5-9447-9A14-372763DF389E}"/>
+              </a:ext>
+            </a:extLst>
+          </p:cNvPr>
+          <p:cNvSpPr txBox="1"/>
+          <p:nvPr/>
+        </p:nvSpPr>
+        <p:spPr>
+          <a:xfrm>
+            <a:off x="482600" y="1762565"/>
+            <a:ext cx="11226800" cy="5016758"/>
+          </a:xfrm>
+          <a:prstGeom prst="rect">
+            <a:avLst/>
+          </a:prstGeom>
+          <a:noFill/>
+        </p:spPr>
+        <p:txBody>
+          <a:bodyPr wrap="square" rtlCol="0">
+            <a:spAutoFit/>
+          </a:bodyPr>
+          <a:lstStyle/>
+          <a:p>
+            <a:pPr algn="just"/>
+            <a:r>
+              <a:rPr lang="en-US" sz="3200" dirty="0"/>
+              <a:t>O </a:t>
+            </a:r>
+            <a:r>
+              <a:rPr lang="en-US" sz="3200" dirty="0" err="1"/>
+              <a:t>relatório</a:t>
+            </a:r>
+            <a:r>
+              <a:rPr lang="en-US" sz="3200" dirty="0"/>
+              <a:t> de </a:t>
+            </a:r>
+            <a:r>
+              <a:rPr lang="en-US" sz="3200" dirty="0" err="1"/>
+              <a:t>cobertura</a:t>
+            </a:r>
+            <a:r>
+              <a:rPr lang="en-US" sz="3200" dirty="0"/>
+              <a:t> de </a:t>
+            </a:r>
+            <a:r>
+              <a:rPr lang="en-US" sz="3200" dirty="0" err="1"/>
+              <a:t>código</a:t>
+            </a:r>
+            <a:r>
+              <a:rPr lang="en-US" sz="3200" dirty="0"/>
+              <a:t> do </a:t>
+            </a:r>
+            <a:r>
+              <a:rPr lang="en-US" sz="3200" dirty="0" err="1"/>
+              <a:t>JaCoCo</a:t>
+            </a:r>
+            <a:r>
+              <a:rPr lang="en-US" sz="3200" dirty="0"/>
+              <a:t> </a:t>
+            </a:r>
+            <a:r>
+              <a:rPr lang="en-US" sz="3200" b="1" dirty="0"/>
+              <a:t>NÃO</a:t>
+            </a:r>
+            <a:r>
+              <a:rPr lang="en-US" sz="3200" dirty="0"/>
+              <a:t> </a:t>
+            </a:r>
+            <a:r>
+              <a:rPr lang="en-US" sz="3200" dirty="0" err="1"/>
+              <a:t>é</a:t>
+            </a:r>
+            <a:r>
+              <a:rPr lang="en-US" sz="3200" dirty="0"/>
+              <a:t> </a:t>
+            </a:r>
+            <a:r>
+              <a:rPr lang="en-US" sz="3200" dirty="0" err="1"/>
+              <a:t>gerado</a:t>
+            </a:r>
+            <a:r>
+              <a:rPr lang="en-US" sz="3200" dirty="0"/>
+              <a:t> se </a:t>
+            </a:r>
+            <a:r>
+              <a:rPr lang="en-US" sz="3200" dirty="0" err="1"/>
+              <a:t>existir</a:t>
+            </a:r>
+            <a:r>
+              <a:rPr lang="en-US" sz="3200" dirty="0"/>
+              <a:t> </a:t>
+            </a:r>
+            <a:r>
+              <a:rPr lang="en-US" sz="3200" dirty="0" err="1"/>
+              <a:t>algum</a:t>
+            </a:r>
+            <a:r>
+              <a:rPr lang="en-US" sz="3200" dirty="0"/>
+              <a:t> </a:t>
+            </a:r>
+            <a:r>
+              <a:rPr lang="en-US" sz="3200" dirty="0" err="1"/>
+              <a:t>espaço</a:t>
+            </a:r>
+            <a:r>
+              <a:rPr lang="en-US" sz="3200" dirty="0"/>
+              <a:t> </a:t>
+            </a:r>
+            <a:r>
+              <a:rPr lang="en-US" sz="3200" dirty="0" err="1"/>
+              <a:t>em</a:t>
+            </a:r>
+            <a:r>
+              <a:rPr lang="en-US" sz="3200" dirty="0"/>
+              <a:t> </a:t>
+            </a:r>
+            <a:r>
+              <a:rPr lang="en-US" sz="3200" dirty="0" err="1"/>
+              <a:t>qualquer</a:t>
+            </a:r>
+            <a:r>
+              <a:rPr lang="en-US" sz="3200" dirty="0"/>
+              <a:t> </a:t>
+            </a:r>
+            <a:r>
+              <a:rPr lang="en-US" sz="3200" dirty="0" err="1"/>
+              <a:t>lugar</a:t>
+            </a:r>
+            <a:r>
+              <a:rPr lang="en-US" sz="3200" dirty="0"/>
+              <a:t> no </a:t>
+            </a:r>
+            <a:r>
+              <a:rPr lang="en-US" sz="3200" dirty="0" err="1"/>
+              <a:t>caminho</a:t>
+            </a:r>
+            <a:r>
+              <a:rPr lang="en-US" sz="3200" dirty="0"/>
+              <a:t> </a:t>
+            </a:r>
+            <a:r>
+              <a:rPr lang="en-US" sz="3200" dirty="0" err="1"/>
+              <a:t>completo</a:t>
+            </a:r>
+            <a:r>
+              <a:rPr lang="en-US" sz="3200" dirty="0"/>
+              <a:t> da pasta </a:t>
+            </a:r>
+            <a:r>
+              <a:rPr lang="en-US" sz="3200" dirty="0" err="1"/>
+              <a:t>onde</a:t>
+            </a:r>
+            <a:r>
+              <a:rPr lang="en-US" sz="3200" dirty="0"/>
+              <a:t> </a:t>
+            </a:r>
+            <a:r>
+              <a:rPr lang="en-US" sz="3200" dirty="0" err="1"/>
+              <a:t>você</a:t>
+            </a:r>
+            <a:r>
+              <a:rPr lang="en-US" sz="3200" dirty="0"/>
+              <a:t> </a:t>
+            </a:r>
+            <a:r>
+              <a:rPr lang="en-US" sz="3200" dirty="0" err="1"/>
+              <a:t>salvou</a:t>
+            </a:r>
+            <a:r>
+              <a:rPr lang="en-US" sz="3200" dirty="0"/>
+              <a:t> o </a:t>
+            </a:r>
+            <a:r>
+              <a:rPr lang="en-US" sz="3200" dirty="0" err="1"/>
+              <a:t>projeto</a:t>
+            </a:r>
+            <a:r>
+              <a:rPr lang="en-US" sz="3200" dirty="0"/>
+              <a:t>. Por </a:t>
+            </a:r>
+            <a:r>
+              <a:rPr lang="en-US" sz="3200" dirty="0" err="1"/>
+              <a:t>exemplo</a:t>
+            </a:r>
+            <a:r>
+              <a:rPr lang="en-US" sz="3200" dirty="0"/>
+              <a:t>, se o </a:t>
+            </a:r>
+            <a:r>
+              <a:rPr lang="en-US" sz="3200" dirty="0" err="1"/>
+              <a:t>projeto</a:t>
+            </a:r>
+            <a:r>
+              <a:rPr lang="en-US" sz="3200" dirty="0"/>
+              <a:t> </a:t>
+            </a:r>
+            <a:r>
+              <a:rPr lang="en-US" sz="3200" dirty="0" err="1"/>
+              <a:t>estiver</a:t>
+            </a:r>
+            <a:r>
+              <a:rPr lang="en-US" sz="3200" dirty="0"/>
+              <a:t> </a:t>
+            </a:r>
+            <a:r>
+              <a:rPr lang="en-US" sz="3200" dirty="0" err="1"/>
+              <a:t>em</a:t>
+            </a:r>
+            <a:r>
+              <a:rPr lang="en-US" sz="3200" dirty="0"/>
+              <a:t>: </a:t>
+            </a:r>
+          </a:p>
+          <a:p>
+            <a:pPr algn="ctr"/>
+            <a:r>
+              <a:rPr lang="en-US" sz="3200" i="1" dirty="0"/>
+              <a:t>/home/</a:t>
+            </a:r>
+            <a:r>
+              <a:rPr lang="en-US" sz="3200" i="1" dirty="0" err="1"/>
+              <a:t>usuario</a:t>
+            </a:r>
+            <a:r>
+              <a:rPr lang="en-US" sz="3200" i="1" dirty="0"/>
+              <a:t>/meus </a:t>
+            </a:r>
+            <a:r>
+              <a:rPr lang="en-US" sz="3200" i="1" dirty="0" err="1"/>
+              <a:t>projetos</a:t>
+            </a:r>
+            <a:r>
+              <a:rPr lang="en-US" sz="3200" i="1" dirty="0"/>
+              <a:t>/</a:t>
+            </a:r>
+            <a:r>
+              <a:rPr lang="en-US" sz="3200" i="1" dirty="0" err="1"/>
+              <a:t>projeto</a:t>
+            </a:r>
+            <a:r>
+              <a:rPr lang="en-US" sz="3200" i="1" dirty="0"/>
+              <a:t> </a:t>
+            </a:r>
+            <a:r>
+              <a:rPr lang="en-US" sz="3200" i="1" dirty="0" err="1"/>
+              <a:t>incrível</a:t>
+            </a:r>
+            <a:br>
+              <a:rPr lang="en-US" sz="3200" i="1" dirty="0"/>
+            </a:br>
+            <a:endParaRPr lang="en-US" sz="3200" dirty="0"/>
+          </a:p>
+          <a:p>
+            <a:pPr algn="just"/>
+            <a:r>
+              <a:rPr lang="en-US" sz="3200" dirty="0" err="1"/>
+              <a:t>você</a:t>
+            </a:r>
+            <a:r>
+              <a:rPr lang="en-US" sz="3200" dirty="0"/>
+              <a:t> </a:t>
+            </a:r>
+            <a:r>
+              <a:rPr lang="en-US" sz="3200" dirty="0" err="1"/>
+              <a:t>deverá</a:t>
+            </a:r>
+            <a:r>
+              <a:rPr lang="en-US" sz="3200" dirty="0"/>
+              <a:t> </a:t>
+            </a:r>
+            <a:r>
+              <a:rPr lang="en-US" sz="3200" dirty="0" err="1"/>
+              <a:t>renomear</a:t>
+            </a:r>
+            <a:r>
+              <a:rPr lang="en-US" sz="3200" dirty="0"/>
+              <a:t> as pastas para algo </a:t>
+            </a:r>
+            <a:r>
+              <a:rPr lang="en-US" sz="3200" dirty="0" err="1"/>
+              <a:t>como</a:t>
+            </a:r>
+            <a:r>
+              <a:rPr lang="en-US" sz="3200" dirty="0"/>
+              <a:t> (</a:t>
+            </a:r>
+            <a:r>
+              <a:rPr lang="en-US" sz="3200" dirty="0" err="1"/>
+              <a:t>preferencialmente</a:t>
+            </a:r>
+            <a:r>
+              <a:rPr lang="en-US" sz="3200" dirty="0"/>
+              <a:t> </a:t>
+            </a:r>
+            <a:r>
+              <a:rPr lang="en-US" sz="3200" dirty="0" err="1"/>
+              <a:t>evitando</a:t>
+            </a:r>
+            <a:r>
+              <a:rPr lang="en-US" sz="3200" dirty="0"/>
+              <a:t> </a:t>
+            </a:r>
+            <a:r>
+              <a:rPr lang="en-US" sz="3200" dirty="0" err="1"/>
+              <a:t>acentos</a:t>
+            </a:r>
+            <a:r>
+              <a:rPr lang="en-US" sz="3200" dirty="0"/>
+              <a:t>) </a:t>
+            </a:r>
+          </a:p>
+          <a:p>
+            <a:endParaRPr lang="en-US" sz="3200" dirty="0"/>
+          </a:p>
+          <a:p>
+            <a:pPr algn="ctr"/>
+            <a:r>
+              <a:rPr lang="en-US" sz="3200" i="1" dirty="0"/>
+              <a:t>/home/</a:t>
+            </a:r>
+            <a:r>
+              <a:rPr lang="en-US" sz="3200" i="1" dirty="0" err="1"/>
+              <a:t>usuario</a:t>
+            </a:r>
+            <a:r>
+              <a:rPr lang="en-US" sz="3200" i="1" dirty="0"/>
+              <a:t>/meus-</a:t>
+            </a:r>
+            <a:r>
+              <a:rPr lang="en-US" sz="3200" i="1" dirty="0" err="1"/>
+              <a:t>projetos</a:t>
+            </a:r>
+            <a:r>
+              <a:rPr lang="en-US" sz="3200" i="1" dirty="0"/>
+              <a:t>/</a:t>
+            </a:r>
+            <a:r>
+              <a:rPr lang="en-US" sz="3200" i="1" dirty="0" err="1"/>
+              <a:t>projeto-incrivel</a:t>
+            </a:r>
+            <a:endParaRPr lang="en-BR" sz="3200" i="1" dirty="0"/>
+          </a:p>
+        </p:txBody>
+      </p:sp>
+    </p:spTree>
+    <p:extLst>
+      <p:ext uri="{BB962C8B-B14F-4D97-AF65-F5344CB8AC3E}">
+        <p14:creationId xmlns:p14="http://schemas.microsoft.com/office/powerpoint/2010/main" val="2519566503"/>
+      </p:ext>
+    </p:extLst>
+  </p:cSld>
+  <p:clrMapOvr>
+    <a:masterClrMapping/>
+  </p:clrMapOvr>
+</p:sld>
+</file>
+
+<file path=ppt/slides/slide12.xml><?xml version="1.0" encoding="utf-8"?>
 <p:sld xmlns:a="http://schemas.openxmlformats.org/drawingml/2006/main" xmlns:r="http://schemas.openxmlformats.org/officeDocument/2006/relationships" xmlns:p="http://schemas.openxmlformats.org/presentationml/2006/main">
   <p:cSld>
     <p:bg>

</xml_diff>